<commit_message>
add pdf for sl slides
</commit_message>
<xml_diff>
--- a/slides/SL.pptx
+++ b/slides/SL.pptx
@@ -731,71 +731,6 @@
           <a:bodyPr/>
           <a:lstStyle/>
           <a:p>
-            <a:r>
-              <a:rPr lang="en-US" dirty="0"/>
-              <a:t>Explain R6 in terms of how they will interact with it, </a:t>
-            </a:r>
-            <a:r>
-              <a:rPr lang="en-US" dirty="0" err="1"/>
-              <a:t>eg</a:t>
-            </a:r>
-            <a:r>
-              <a:rPr lang="en-US" dirty="0"/>
-              <a:t> </a:t>
-            </a:r>
-            <a:r>
-              <a:rPr lang="en-US" dirty="0" err="1"/>
-              <a:t>Lrnr_rf$train</a:t>
-            </a:r>
-            <a:r>
-              <a:rPr lang="en-US" dirty="0"/>
-              <a:t> vs </a:t>
-            </a:r>
-            <a:r>
-              <a:rPr lang="en-US" dirty="0" err="1"/>
-              <a:t>randomForest</a:t>
-            </a:r>
-            <a:endParaRPr lang="en-US" dirty="0"/>
-          </a:p>
-          <a:p>
-            <a:r>
-              <a:rPr lang="en-US" dirty="0"/>
-              <a:t>what you can do with trained learners, </a:t>
-            </a:r>
-            <a:r>
-              <a:rPr lang="en-US" dirty="0" err="1"/>
-              <a:t>eg</a:t>
-            </a:r>
-            <a:r>
-              <a:rPr lang="en-US" dirty="0"/>
-              <a:t> predict, importance, </a:t>
-            </a:r>
-          </a:p>
-          <a:p>
-            <a:r>
-              <a:rPr lang="en-US" dirty="0"/>
-              <a:t>S4 methods bundled at class level, </a:t>
-            </a:r>
-            <a:r>
-              <a:rPr lang="en-US" dirty="0" err="1"/>
-              <a:t>eg</a:t>
-            </a:r>
-            <a:r>
-              <a:rPr lang="en-US" dirty="0"/>
-              <a:t> </a:t>
-            </a:r>
-            <a:r>
-              <a:rPr lang="en-US" dirty="0" err="1"/>
-              <a:t>predict.randomForest</a:t>
-            </a:r>
-            <a:r>
-              <a:rPr lang="en-US" dirty="0"/>
-              <a:t>, instead </a:t>
-            </a:r>
-            <a:r>
-              <a:rPr lang="en-US"/>
-              <a:t>of class level</a:t>
-            </a:r>
             <a:endParaRPr lang="en-US" dirty="0"/>
           </a:p>
         </p:txBody>
@@ -9457,14 +9392,14 @@
           <a:ln/>
           <a:extLst>
             <a:ext uri="{909E8E84-426E-40dd-AFC4-6F175D3DCCD1}">
-              <a14:hiddenFill xmlns:a14="http://schemas.microsoft.com/office/drawing/2010/main" xmlns="">
+              <a14:hiddenFill xmlns="" xmlns:a14="http://schemas.microsoft.com/office/drawing/2010/main">
                 <a:solidFill>
                   <a:srgbClr val="FFFFFF"/>
                 </a:solidFill>
               </a14:hiddenFill>
             </a:ext>
             <a:ext uri="{91240B29-F687-4f45-9708-019B960494DF}">
-              <a14:hiddenLine xmlns:a14="http://schemas.microsoft.com/office/drawing/2010/main" xmlns="" w="9525">
+              <a14:hiddenLine xmlns="" xmlns:a14="http://schemas.microsoft.com/office/drawing/2010/main" w="9525">
                 <a:solidFill>
                   <a:srgbClr val="000000"/>
                 </a:solidFill>
@@ -13330,14 +13265,14 @@
           <a:ln/>
           <a:extLst>
             <a:ext uri="{909E8E84-426E-40dd-AFC4-6F175D3DCCD1}">
-              <a14:hiddenFill xmlns:a14="http://schemas.microsoft.com/office/drawing/2010/main" xmlns="">
+              <a14:hiddenFill xmlns="" xmlns:a14="http://schemas.microsoft.com/office/drawing/2010/main">
                 <a:solidFill>
                   <a:srgbClr val="FFFFFF"/>
                 </a:solidFill>
               </a14:hiddenFill>
             </a:ext>
             <a:ext uri="{91240B29-F687-4f45-9708-019B960494DF}">
-              <a14:hiddenLine xmlns:a14="http://schemas.microsoft.com/office/drawing/2010/main" xmlns="" w="9525">
+              <a14:hiddenLine xmlns="" xmlns:a14="http://schemas.microsoft.com/office/drawing/2010/main" w="9525">
                 <a:solidFill>
                   <a:srgbClr val="000000"/>
                 </a:solidFill>
@@ -14748,14 +14683,14 @@
           <a:ln/>
           <a:extLst>
             <a:ext uri="{909E8E84-426E-40dd-AFC4-6F175D3DCCD1}">
-              <a14:hiddenFill xmlns:a14="http://schemas.microsoft.com/office/drawing/2010/main" xmlns="">
+              <a14:hiddenFill xmlns="" xmlns:a14="http://schemas.microsoft.com/office/drawing/2010/main">
                 <a:solidFill>
                   <a:srgbClr val="FFFFFF"/>
                 </a:solidFill>
               </a14:hiddenFill>
             </a:ext>
             <a:ext uri="{91240B29-F687-4f45-9708-019B960494DF}">
-              <a14:hiddenLine xmlns:a14="http://schemas.microsoft.com/office/drawing/2010/main" xmlns="" w="9525">
+              <a14:hiddenLine xmlns="" xmlns:a14="http://schemas.microsoft.com/office/drawing/2010/main" w="9525">
                 <a:solidFill>
                   <a:srgbClr val="000000"/>
                 </a:solidFill>
@@ -15570,14 +15505,14 @@
           <a:ln/>
           <a:extLst>
             <a:ext uri="{909E8E84-426E-40dd-AFC4-6F175D3DCCD1}">
-              <a14:hiddenFill xmlns:a14="http://schemas.microsoft.com/office/drawing/2010/main" xmlns="">
+              <a14:hiddenFill xmlns="" xmlns:a14="http://schemas.microsoft.com/office/drawing/2010/main">
                 <a:solidFill>
                   <a:srgbClr val="FFFFFF"/>
                 </a:solidFill>
               </a14:hiddenFill>
             </a:ext>
             <a:ext uri="{91240B29-F687-4f45-9708-019B960494DF}">
-              <a14:hiddenLine xmlns:a14="http://schemas.microsoft.com/office/drawing/2010/main" xmlns="" w="9525">
+              <a14:hiddenLine xmlns="" xmlns:a14="http://schemas.microsoft.com/office/drawing/2010/main" w="9525">
                 <a:solidFill>
                   <a:srgbClr val="000000"/>
                 </a:solidFill>

</xml_diff>